<commit_message>
Docs : refactoring fulfillment login function code file
</commit_message>
<xml_diff>
--- a/프레젠테이션1.pptx
+++ b/프레젠테이션1.pptx
@@ -6276,11 +6276,7 @@
           <a:p>
             <a:r>
               <a:rPr lang="ko-KR" altLang="en-US" dirty="0" smtClean="0"/>
-              <a:t>발주 코드 </a:t>
-            </a:r>
-            <a:r>
-              <a:rPr lang="ko-KR" altLang="en-US" dirty="0" smtClean="0"/>
-              <a:t>                            날짜                                  금액</a:t>
+              <a:t>발주 코드                             날짜                                  금액</a:t>
             </a:r>
             <a:endParaRPr lang="ko-KR" altLang="en-US" dirty="0"/>
           </a:p>
@@ -14309,188 +14305,253 @@
           </a:p>
         </p:txBody>
       </p:sp>
+      <p:sp>
+        <p:nvSpPr>
+          <p:cNvPr id="3" name="모서리가 둥근 직사각형 2"/>
+          <p:cNvSpPr/>
+          <p:nvPr/>
+        </p:nvSpPr>
+        <p:spPr>
+          <a:xfrm>
+            <a:off x="1763688" y="836712"/>
+            <a:ext cx="6688539" cy="4680519"/>
+          </a:xfrm>
+          <a:prstGeom prst="roundRect">
+            <a:avLst/>
+          </a:prstGeom>
+          <a:ln/>
+        </p:spPr>
+        <p:style>
+          <a:lnRef idx="2">
+            <a:schemeClr val="accent2"/>
+          </a:lnRef>
+          <a:fillRef idx="1">
+            <a:schemeClr val="lt1"/>
+          </a:fillRef>
+          <a:effectRef idx="0">
+            <a:schemeClr val="accent2"/>
+          </a:effectRef>
+          <a:fontRef idx="minor">
+            <a:schemeClr val="dk1"/>
+          </a:fontRef>
+        </p:style>
+        <p:txBody>
+          <a:bodyPr rtlCol="0" anchor="ctr"/>
+          <a:lstStyle/>
+          <a:p>
+            <a:pPr algn="ctr"/>
+            <a:endParaRPr lang="ko-KR" altLang="en-US" b="1" dirty="0">
+              <a:solidFill>
+                <a:schemeClr val="tx1"/>
+              </a:solidFill>
+            </a:endParaRPr>
+          </a:p>
+        </p:txBody>
+      </p:sp>
+      <p:sp>
+        <p:nvSpPr>
+          <p:cNvPr id="6" name="TextBox 5"/>
+          <p:cNvSpPr txBox="1"/>
+          <p:nvPr/>
+        </p:nvSpPr>
+        <p:spPr>
+          <a:xfrm>
+            <a:off x="2251984" y="1672859"/>
+            <a:ext cx="1631351" cy="2308324"/>
+          </a:xfrm>
+          <a:prstGeom prst="rect">
+            <a:avLst/>
+          </a:prstGeom>
+          <a:noFill/>
+        </p:spPr>
+        <p:txBody>
+          <a:bodyPr wrap="square" rtlCol="0">
+            <a:spAutoFit/>
+          </a:bodyPr>
+          <a:lstStyle/>
+          <a:p>
+            <a:pPr algn="r"/>
+            <a:r>
+              <a:rPr lang="ko-KR" altLang="en-US" smtClean="0"/>
+              <a:t>이름 </a:t>
+            </a:r>
+            <a:r>
+              <a:rPr lang="en-US" altLang="ko-KR" dirty="0" smtClean="0"/>
+              <a:t>:</a:t>
+            </a:r>
+          </a:p>
+          <a:p>
+            <a:pPr algn="r"/>
+            <a:endParaRPr lang="en-US" altLang="ko-KR" dirty="0" smtClean="0"/>
+          </a:p>
+          <a:p>
+            <a:pPr algn="r"/>
+            <a:r>
+              <a:rPr lang="ko-KR" altLang="en-US" dirty="0" smtClean="0"/>
+              <a:t>비밀번호 </a:t>
+            </a:r>
+            <a:r>
+              <a:rPr lang="en-US" altLang="ko-KR" dirty="0" smtClean="0"/>
+              <a:t>:</a:t>
+            </a:r>
+          </a:p>
+          <a:p>
+            <a:pPr algn="r"/>
+            <a:endParaRPr lang="en-US" altLang="ko-KR" dirty="0" smtClean="0"/>
+          </a:p>
+          <a:p>
+            <a:pPr algn="r"/>
+            <a:endParaRPr lang="en-US" altLang="ko-KR" dirty="0" smtClean="0"/>
+          </a:p>
+          <a:p>
+            <a:pPr algn="r"/>
+            <a:r>
+              <a:rPr lang="ko-KR" altLang="en-US" dirty="0" smtClean="0"/>
+              <a:t>사용자유형 </a:t>
+            </a:r>
+            <a:r>
+              <a:rPr lang="en-US" altLang="ko-KR" dirty="0" smtClean="0"/>
+              <a:t>:</a:t>
+            </a:r>
+          </a:p>
+          <a:p>
+            <a:pPr algn="r"/>
+            <a:endParaRPr lang="en-US" altLang="ko-KR" dirty="0"/>
+          </a:p>
+          <a:p>
+            <a:pPr algn="r"/>
+            <a:r>
+              <a:rPr lang="ko-KR" altLang="en-US" dirty="0" smtClean="0"/>
+              <a:t>지역 </a:t>
+            </a:r>
+            <a:r>
+              <a:rPr lang="en-US" altLang="ko-KR" dirty="0" smtClean="0"/>
+              <a:t>:</a:t>
+            </a:r>
+            <a:endParaRPr lang="ko-KR" altLang="en-US" dirty="0"/>
+          </a:p>
+        </p:txBody>
+      </p:sp>
+      <p:sp>
+        <p:nvSpPr>
+          <p:cNvPr id="9" name="직사각형 8"/>
+          <p:cNvSpPr/>
+          <p:nvPr/>
+        </p:nvSpPr>
+        <p:spPr>
+          <a:xfrm>
+            <a:off x="4373849" y="1556792"/>
+            <a:ext cx="3099567" cy="502647"/>
+          </a:xfrm>
+          <a:prstGeom prst="rect">
+            <a:avLst/>
+          </a:prstGeom>
+        </p:spPr>
+        <p:style>
+          <a:lnRef idx="2">
+            <a:schemeClr val="accent2">
+              <a:shade val="50000"/>
+            </a:schemeClr>
+          </a:lnRef>
+          <a:fillRef idx="1">
+            <a:schemeClr val="accent2"/>
+          </a:fillRef>
+          <a:effectRef idx="0">
+            <a:schemeClr val="accent2"/>
+          </a:effectRef>
+          <a:fontRef idx="minor">
+            <a:schemeClr val="lt1"/>
+          </a:fontRef>
+        </p:style>
+        <p:txBody>
+          <a:bodyPr rtlCol="0" anchor="ctr"/>
+          <a:lstStyle/>
+          <a:p>
+            <a:pPr algn="ctr"/>
+            <a:endParaRPr lang="ko-KR" altLang="en-US"/>
+          </a:p>
+        </p:txBody>
+      </p:sp>
+      <p:sp>
+        <p:nvSpPr>
+          <p:cNvPr id="10" name="직사각형 9"/>
+          <p:cNvSpPr/>
+          <p:nvPr/>
+        </p:nvSpPr>
+        <p:spPr>
+          <a:xfrm>
+            <a:off x="4373849" y="2204864"/>
+            <a:ext cx="3099567" cy="502647"/>
+          </a:xfrm>
+          <a:prstGeom prst="rect">
+            <a:avLst/>
+          </a:prstGeom>
+        </p:spPr>
+        <p:style>
+          <a:lnRef idx="2">
+            <a:schemeClr val="accent2">
+              <a:shade val="50000"/>
+            </a:schemeClr>
+          </a:lnRef>
+          <a:fillRef idx="1">
+            <a:schemeClr val="accent2"/>
+          </a:fillRef>
+          <a:effectRef idx="0">
+            <a:schemeClr val="accent2"/>
+          </a:effectRef>
+          <a:fontRef idx="minor">
+            <a:schemeClr val="lt1"/>
+          </a:fontRef>
+        </p:style>
+        <p:txBody>
+          <a:bodyPr rtlCol="0" anchor="ctr"/>
+          <a:lstStyle/>
+          <a:p>
+            <a:pPr algn="ctr"/>
+            <a:endParaRPr lang="ko-KR" altLang="en-US"/>
+          </a:p>
+        </p:txBody>
+      </p:sp>
       <p:grpSp>
         <p:nvGrpSpPr>
-          <p:cNvPr id="31" name="그룹 30"/>
+          <p:cNvPr id="29" name="그룹 28"/>
           <p:cNvGrpSpPr/>
           <p:nvPr/>
         </p:nvGrpSpPr>
         <p:grpSpPr>
           <a:xfrm>
-            <a:off x="1763688" y="836712"/>
-            <a:ext cx="6912768" cy="4680519"/>
-            <a:chOff x="2123728" y="1347211"/>
-            <a:chExt cx="6102606" cy="4022524"/>
+            <a:off x="3883335" y="3179217"/>
+            <a:ext cx="4793121" cy="537815"/>
+            <a:chOff x="4013030" y="3852257"/>
+            <a:chExt cx="4231377" cy="462208"/>
           </a:xfrm>
         </p:grpSpPr>
         <p:sp>
           <p:nvSpPr>
-            <p:cNvPr id="3" name="모서리가 둥근 직사각형 2"/>
+            <p:cNvPr id="15" name="순서도: 연결자 14"/>
             <p:cNvSpPr/>
             <p:nvPr/>
           </p:nvSpPr>
           <p:spPr>
             <a:xfrm>
-              <a:off x="2123728" y="1347211"/>
-              <a:ext cx="5904656" cy="4022524"/>
+              <a:off x="4608004" y="3852257"/>
+              <a:ext cx="144016" cy="144016"/>
             </a:xfrm>
-            <a:prstGeom prst="roundRect">
-              <a:avLst/>
-            </a:prstGeom>
-            <a:ln/>
-          </p:spPr>
-          <p:style>
-            <a:lnRef idx="2">
-              <a:schemeClr val="accent2"/>
-            </a:lnRef>
-            <a:fillRef idx="1">
-              <a:schemeClr val="lt1"/>
-            </a:fillRef>
-            <a:effectRef idx="0">
-              <a:schemeClr val="accent2"/>
-            </a:effectRef>
-            <a:fontRef idx="minor">
-              <a:schemeClr val="dk1"/>
-            </a:fontRef>
-          </p:style>
-          <p:txBody>
-            <a:bodyPr rtlCol="0" anchor="ctr"/>
-            <a:lstStyle/>
-            <a:p>
-              <a:pPr algn="ctr"/>
-              <a:endParaRPr lang="ko-KR" altLang="en-US" b="1" dirty="0">
-                <a:solidFill>
-                  <a:schemeClr val="tx1"/>
-                </a:solidFill>
-              </a:endParaRPr>
-            </a:p>
-          </p:txBody>
-        </p:sp>
-        <p:sp>
-          <p:nvSpPr>
-            <p:cNvPr id="6" name="TextBox 5"/>
-            <p:cNvSpPr txBox="1"/>
-            <p:nvPr/>
-          </p:nvSpPr>
-          <p:spPr>
-            <a:xfrm>
-              <a:off x="2554797" y="2065811"/>
-              <a:ext cx="1440160" cy="2862322"/>
-            </a:xfrm>
-            <a:prstGeom prst="rect">
-              <a:avLst/>
-            </a:prstGeom>
-            <a:noFill/>
-          </p:spPr>
-          <p:txBody>
-            <a:bodyPr wrap="square" rtlCol="0">
-              <a:spAutoFit/>
-            </a:bodyPr>
-            <a:lstStyle/>
-            <a:p>
-              <a:pPr algn="r"/>
-              <a:r>
-                <a:rPr lang="ko-KR" altLang="en-US" dirty="0" smtClean="0"/>
-                <a:t>아이디 </a:t>
-              </a:r>
-              <a:r>
-                <a:rPr lang="en-US" altLang="ko-KR" dirty="0" smtClean="0"/>
-                <a:t>:</a:t>
-              </a:r>
-            </a:p>
-            <a:p>
-              <a:pPr algn="r"/>
-              <a:endParaRPr lang="en-US" altLang="ko-KR" dirty="0" smtClean="0"/>
-            </a:p>
-            <a:p>
-              <a:pPr algn="r"/>
-              <a:r>
-                <a:rPr lang="ko-KR" altLang="en-US" dirty="0" smtClean="0"/>
-                <a:t>이름 </a:t>
-              </a:r>
-              <a:r>
-                <a:rPr lang="en-US" altLang="ko-KR" dirty="0" smtClean="0"/>
-                <a:t>:</a:t>
-              </a:r>
-            </a:p>
-            <a:p>
-              <a:pPr algn="r"/>
-              <a:endParaRPr lang="en-US" altLang="ko-KR" dirty="0" smtClean="0"/>
-            </a:p>
-            <a:p>
-              <a:pPr algn="r"/>
-              <a:r>
-                <a:rPr lang="ko-KR" altLang="en-US" dirty="0" smtClean="0"/>
-                <a:t>비밀번호 </a:t>
-              </a:r>
-              <a:r>
-                <a:rPr lang="en-US" altLang="ko-KR" dirty="0" smtClean="0"/>
-                <a:t>:</a:t>
-              </a:r>
-            </a:p>
-            <a:p>
-              <a:pPr algn="r"/>
-              <a:endParaRPr lang="en-US" altLang="ko-KR" dirty="0" smtClean="0"/>
-            </a:p>
-            <a:p>
-              <a:pPr algn="r"/>
-              <a:endParaRPr lang="en-US" altLang="ko-KR" dirty="0" smtClean="0"/>
-            </a:p>
-            <a:p>
-              <a:pPr algn="r"/>
-              <a:r>
-                <a:rPr lang="ko-KR" altLang="en-US" dirty="0" smtClean="0"/>
-                <a:t>사용자유형 </a:t>
-              </a:r>
-              <a:r>
-                <a:rPr lang="en-US" altLang="ko-KR" dirty="0" smtClean="0"/>
-                <a:t>:</a:t>
-              </a:r>
-            </a:p>
-            <a:p>
-              <a:pPr algn="r"/>
-              <a:endParaRPr lang="en-US" altLang="ko-KR" dirty="0"/>
-            </a:p>
-            <a:p>
-              <a:pPr algn="r"/>
-              <a:r>
-                <a:rPr lang="ko-KR" altLang="en-US" dirty="0" smtClean="0"/>
-                <a:t>지역 </a:t>
-              </a:r>
-              <a:r>
-                <a:rPr lang="en-US" altLang="ko-KR" dirty="0" smtClean="0"/>
-                <a:t>:</a:t>
-              </a:r>
-              <a:endParaRPr lang="ko-KR" altLang="en-US" dirty="0"/>
-            </a:p>
-          </p:txBody>
-        </p:sp>
-        <p:sp>
-          <p:nvSpPr>
-            <p:cNvPr id="9" name="직사각형 8"/>
-            <p:cNvSpPr/>
-            <p:nvPr/>
-          </p:nvSpPr>
-          <p:spPr>
-            <a:xfrm>
-              <a:off x="4427984" y="2060976"/>
-              <a:ext cx="2736304" cy="431984"/>
-            </a:xfrm>
-            <a:prstGeom prst="rect">
+            <a:prstGeom prst="flowChartConnector">
               <a:avLst/>
             </a:prstGeom>
           </p:spPr>
           <p:style>
             <a:lnRef idx="2">
-              <a:schemeClr val="accent2">
+              <a:schemeClr val="accent1">
                 <a:shade val="50000"/>
               </a:schemeClr>
             </a:lnRef>
             <a:fillRef idx="1">
-              <a:schemeClr val="accent2"/>
+              <a:schemeClr val="accent1"/>
             </a:fillRef>
             <a:effectRef idx="0">
-              <a:schemeClr val="accent2"/>
+              <a:schemeClr val="accent1"/>
             </a:effectRef>
             <a:fontRef idx="minor">
               <a:schemeClr val="lt1"/>
@@ -14507,30 +14568,30 @@
         </p:sp>
         <p:sp>
           <p:nvSpPr>
-            <p:cNvPr id="10" name="직사각형 9"/>
+            <p:cNvPr id="16" name="순서도: 연결자 15"/>
             <p:cNvSpPr/>
             <p:nvPr/>
           </p:nvSpPr>
           <p:spPr>
             <a:xfrm>
-              <a:off x="4427984" y="2564904"/>
-              <a:ext cx="2736304" cy="431984"/>
+              <a:off x="5813231" y="3852257"/>
+              <a:ext cx="144016" cy="144016"/>
             </a:xfrm>
-            <a:prstGeom prst="rect">
+            <a:prstGeom prst="flowChartConnector">
               <a:avLst/>
             </a:prstGeom>
           </p:spPr>
           <p:style>
             <a:lnRef idx="2">
-              <a:schemeClr val="accent2">
+              <a:schemeClr val="accent1">
                 <a:shade val="50000"/>
               </a:schemeClr>
             </a:lnRef>
             <a:fillRef idx="1">
-              <a:schemeClr val="accent2"/>
+              <a:schemeClr val="accent1"/>
             </a:fillRef>
             <a:effectRef idx="0">
-              <a:schemeClr val="accent2"/>
+              <a:schemeClr val="accent1"/>
             </a:effectRef>
             <a:fontRef idx="minor">
               <a:schemeClr val="lt1"/>
@@ -14547,30 +14608,30 @@
         </p:sp>
         <p:sp>
           <p:nvSpPr>
-            <p:cNvPr id="11" name="직사각형 10"/>
+            <p:cNvPr id="17" name="순서도: 연결자 16"/>
             <p:cNvSpPr/>
             <p:nvPr/>
           </p:nvSpPr>
           <p:spPr>
             <a:xfrm>
-              <a:off x="4427984" y="3142481"/>
-              <a:ext cx="2736304" cy="431984"/>
+              <a:off x="7018458" y="3852257"/>
+              <a:ext cx="144016" cy="144016"/>
             </a:xfrm>
-            <a:prstGeom prst="rect">
+            <a:prstGeom prst="flowChartConnector">
               <a:avLst/>
             </a:prstGeom>
           </p:spPr>
           <p:style>
             <a:lnRef idx="2">
-              <a:schemeClr val="accent2">
+              <a:schemeClr val="accent1">
                 <a:shade val="50000"/>
               </a:schemeClr>
             </a:lnRef>
             <a:fillRef idx="1">
-              <a:schemeClr val="accent2"/>
+              <a:schemeClr val="accent1"/>
             </a:fillRef>
             <a:effectRef idx="0">
-              <a:schemeClr val="accent2"/>
+              <a:schemeClr val="accent1"/>
             </a:effectRef>
             <a:fontRef idx="minor">
               <a:schemeClr val="lt1"/>
@@ -14585,434 +14646,299 @@
             </a:p>
           </p:txBody>
         </p:sp>
-        <p:grpSp>
-          <p:nvGrpSpPr>
-            <p:cNvPr id="29" name="그룹 28"/>
-            <p:cNvGrpSpPr/>
+        <p:sp>
+          <p:nvSpPr>
+            <p:cNvPr id="23" name="TextBox 22"/>
+            <p:cNvSpPr txBox="1"/>
             <p:nvPr/>
-          </p:nvGrpSpPr>
-          <p:grpSpPr>
+          </p:nvSpPr>
+          <p:spPr>
             <a:xfrm>
-              <a:off x="3994957" y="3999330"/>
-              <a:ext cx="4231377" cy="462208"/>
-              <a:chOff x="4013030" y="3852257"/>
-              <a:chExt cx="4231377" cy="462208"/>
+              <a:off x="4013030" y="4023505"/>
+              <a:ext cx="4231377" cy="290960"/>
             </a:xfrm>
-          </p:grpSpPr>
-          <p:sp>
-            <p:nvSpPr>
-              <p:cNvPr id="15" name="순서도: 연결자 14"/>
-              <p:cNvSpPr/>
-              <p:nvPr/>
-            </p:nvSpPr>
-            <p:spPr>
-              <a:xfrm>
-                <a:off x="4608004" y="3852257"/>
-                <a:ext cx="144016" cy="144016"/>
-              </a:xfrm>
-              <a:prstGeom prst="flowChartConnector">
-                <a:avLst/>
-              </a:prstGeom>
-            </p:spPr>
-            <p:style>
-              <a:lnRef idx="2">
-                <a:schemeClr val="accent1">
-                  <a:shade val="50000"/>
-                </a:schemeClr>
-              </a:lnRef>
-              <a:fillRef idx="1">
-                <a:schemeClr val="accent1"/>
-              </a:fillRef>
-              <a:effectRef idx="0">
-                <a:schemeClr val="accent1"/>
-              </a:effectRef>
-              <a:fontRef idx="minor">
-                <a:schemeClr val="lt1"/>
-              </a:fontRef>
-            </p:style>
-            <p:txBody>
-              <a:bodyPr rtlCol="0" anchor="ctr"/>
-              <a:lstStyle/>
-              <a:p>
-                <a:pPr algn="ctr"/>
-                <a:endParaRPr lang="ko-KR" altLang="en-US"/>
-              </a:p>
-            </p:txBody>
-          </p:sp>
-          <p:sp>
-            <p:nvSpPr>
-              <p:cNvPr id="16" name="순서도: 연결자 15"/>
-              <p:cNvSpPr/>
-              <p:nvPr/>
-            </p:nvSpPr>
-            <p:spPr>
-              <a:xfrm>
-                <a:off x="5813231" y="3852257"/>
-                <a:ext cx="144016" cy="144016"/>
-              </a:xfrm>
-              <a:prstGeom prst="flowChartConnector">
-                <a:avLst/>
-              </a:prstGeom>
-            </p:spPr>
-            <p:style>
-              <a:lnRef idx="2">
-                <a:schemeClr val="accent1">
-                  <a:shade val="50000"/>
-                </a:schemeClr>
-              </a:lnRef>
-              <a:fillRef idx="1">
-                <a:schemeClr val="accent1"/>
-              </a:fillRef>
-              <a:effectRef idx="0">
-                <a:schemeClr val="accent1"/>
-              </a:effectRef>
-              <a:fontRef idx="minor">
-                <a:schemeClr val="lt1"/>
-              </a:fontRef>
-            </p:style>
-            <p:txBody>
-              <a:bodyPr rtlCol="0" anchor="ctr"/>
-              <a:lstStyle/>
-              <a:p>
-                <a:pPr algn="ctr"/>
-                <a:endParaRPr lang="ko-KR" altLang="en-US"/>
-              </a:p>
-            </p:txBody>
-          </p:sp>
-          <p:sp>
-            <p:nvSpPr>
-              <p:cNvPr id="17" name="순서도: 연결자 16"/>
-              <p:cNvSpPr/>
-              <p:nvPr/>
-            </p:nvSpPr>
-            <p:spPr>
-              <a:xfrm>
-                <a:off x="7018458" y="3852257"/>
-                <a:ext cx="144016" cy="144016"/>
-              </a:xfrm>
-              <a:prstGeom prst="flowChartConnector">
-                <a:avLst/>
-              </a:prstGeom>
-            </p:spPr>
-            <p:style>
-              <a:lnRef idx="2">
-                <a:schemeClr val="accent1">
-                  <a:shade val="50000"/>
-                </a:schemeClr>
-              </a:lnRef>
-              <a:fillRef idx="1">
-                <a:schemeClr val="accent1"/>
-              </a:fillRef>
-              <a:effectRef idx="0">
-                <a:schemeClr val="accent1"/>
-              </a:effectRef>
-              <a:fontRef idx="minor">
-                <a:schemeClr val="lt1"/>
-              </a:fontRef>
-            </p:style>
-            <p:txBody>
-              <a:bodyPr rtlCol="0" anchor="ctr"/>
-              <a:lstStyle/>
-              <a:p>
-                <a:pPr algn="ctr"/>
-                <a:endParaRPr lang="ko-KR" altLang="en-US"/>
-              </a:p>
-            </p:txBody>
-          </p:sp>
-          <p:sp>
-            <p:nvSpPr>
-              <p:cNvPr id="23" name="TextBox 22"/>
-              <p:cNvSpPr txBox="1"/>
-              <p:nvPr/>
-            </p:nvSpPr>
-            <p:spPr>
-              <a:xfrm>
-                <a:off x="4013030" y="4023505"/>
-                <a:ext cx="4231377" cy="290960"/>
-              </a:xfrm>
-              <a:prstGeom prst="rect">
-                <a:avLst/>
-              </a:prstGeom>
-              <a:noFill/>
-            </p:spPr>
-            <p:txBody>
-              <a:bodyPr wrap="square" rtlCol="0">
-                <a:spAutoFit/>
-              </a:bodyPr>
-              <a:lstStyle/>
-              <a:p>
-                <a:r>
-                  <a:rPr lang="ko-KR" altLang="en-US" sz="1600" dirty="0" smtClean="0"/>
-                  <a:t> 쇼핑몰운영자     </a:t>
-                </a:r>
-                <a:r>
-                  <a:rPr lang="en-US" altLang="ko-KR" sz="1600" dirty="0" smtClean="0"/>
-                  <a:t> </a:t>
-                </a:r>
-                <a:r>
-                  <a:rPr lang="ko-KR" altLang="en-US" sz="1600" dirty="0" smtClean="0"/>
-                  <a:t>운송업체      구입처운영자</a:t>
-                </a:r>
-                <a:endParaRPr lang="ko-KR" altLang="en-US" sz="1600" dirty="0"/>
-              </a:p>
-            </p:txBody>
-          </p:sp>
-        </p:grpSp>
-        <p:grpSp>
-          <p:nvGrpSpPr>
-            <p:cNvPr id="26" name="그룹 25"/>
-            <p:cNvGrpSpPr/>
+            <a:prstGeom prst="rect">
+              <a:avLst/>
+            </a:prstGeom>
+            <a:noFill/>
+          </p:spPr>
+          <p:txBody>
+            <a:bodyPr wrap="square" rtlCol="0">
+              <a:spAutoFit/>
+            </a:bodyPr>
+            <a:lstStyle/>
+            <a:p>
+              <a:r>
+                <a:rPr lang="ko-KR" altLang="en-US" sz="1600" dirty="0" smtClean="0"/>
+                <a:t> 쇼핑몰운영자     </a:t>
+              </a:r>
+              <a:r>
+                <a:rPr lang="en-US" altLang="ko-KR" sz="1600" dirty="0" smtClean="0"/>
+                <a:t> </a:t>
+              </a:r>
+              <a:r>
+                <a:rPr lang="ko-KR" altLang="en-US" sz="1600" dirty="0" smtClean="0"/>
+                <a:t>운송업체      구입처운영자</a:t>
+              </a:r>
+              <a:endParaRPr lang="ko-KR" altLang="en-US" sz="1600" dirty="0"/>
+            </a:p>
+          </p:txBody>
+        </p:sp>
+      </p:grpSp>
+      <p:grpSp>
+        <p:nvGrpSpPr>
+          <p:cNvPr id="26" name="그룹 25"/>
+          <p:cNvGrpSpPr/>
+          <p:nvPr/>
+        </p:nvGrpSpPr>
+        <p:grpSpPr>
+          <a:xfrm>
+            <a:off x="4174212" y="3756190"/>
+            <a:ext cx="4385284" cy="536906"/>
+            <a:chOff x="4340952" y="4694102"/>
+            <a:chExt cx="3871338" cy="461427"/>
+          </a:xfrm>
+        </p:grpSpPr>
+        <p:sp>
+          <p:nvSpPr>
+            <p:cNvPr id="14" name="순서도: 연결자 13"/>
+            <p:cNvSpPr/>
             <p:nvPr/>
-          </p:nvGrpSpPr>
-          <p:grpSpPr>
+          </p:nvSpPr>
+          <p:spPr>
             <a:xfrm>
-              <a:off x="4251744" y="4558801"/>
-              <a:ext cx="3871338" cy="461427"/>
-              <a:chOff x="4340952" y="4694102"/>
-              <a:chExt cx="3871338" cy="461427"/>
+              <a:off x="4550900" y="4694102"/>
+              <a:ext cx="144016" cy="144016"/>
             </a:xfrm>
-          </p:grpSpPr>
-          <p:sp>
-            <p:nvSpPr>
-              <p:cNvPr id="14" name="순서도: 연결자 13"/>
-              <p:cNvSpPr/>
-              <p:nvPr/>
-            </p:nvSpPr>
-            <p:spPr>
-              <a:xfrm>
-                <a:off x="4550900" y="4694102"/>
-                <a:ext cx="144016" cy="144016"/>
-              </a:xfrm>
-              <a:prstGeom prst="flowChartConnector">
-                <a:avLst/>
-              </a:prstGeom>
-            </p:spPr>
-            <p:style>
-              <a:lnRef idx="2">
-                <a:schemeClr val="accent1">
-                  <a:shade val="50000"/>
-                </a:schemeClr>
-              </a:lnRef>
-              <a:fillRef idx="1">
-                <a:schemeClr val="accent1"/>
-              </a:fillRef>
-              <a:effectRef idx="0">
-                <a:schemeClr val="accent1"/>
-              </a:effectRef>
-              <a:fontRef idx="minor">
-                <a:schemeClr val="lt1"/>
-              </a:fontRef>
-            </p:style>
-            <p:txBody>
-              <a:bodyPr rtlCol="0" anchor="ctr"/>
-              <a:lstStyle/>
-              <a:p>
-                <a:pPr algn="ctr"/>
-                <a:endParaRPr lang="ko-KR" altLang="en-US"/>
-              </a:p>
-            </p:txBody>
-          </p:sp>
-          <p:sp>
-            <p:nvSpPr>
-              <p:cNvPr id="20" name="순서도: 연결자 19"/>
-              <p:cNvSpPr/>
-              <p:nvPr/>
-            </p:nvSpPr>
-            <p:spPr>
-              <a:xfrm>
-                <a:off x="7164288" y="4694102"/>
-                <a:ext cx="144016" cy="144016"/>
-              </a:xfrm>
-              <a:prstGeom prst="flowChartConnector">
-                <a:avLst/>
-              </a:prstGeom>
-            </p:spPr>
-            <p:style>
-              <a:lnRef idx="2">
-                <a:schemeClr val="accent1">
-                  <a:shade val="50000"/>
-                </a:schemeClr>
-              </a:lnRef>
-              <a:fillRef idx="1">
-                <a:schemeClr val="accent1"/>
-              </a:fillRef>
-              <a:effectRef idx="0">
-                <a:schemeClr val="accent1"/>
-              </a:effectRef>
-              <a:fontRef idx="minor">
-                <a:schemeClr val="lt1"/>
-              </a:fontRef>
-            </p:style>
-            <p:txBody>
-              <a:bodyPr rtlCol="0" anchor="ctr"/>
-              <a:lstStyle/>
-              <a:p>
-                <a:pPr algn="ctr"/>
-                <a:endParaRPr lang="ko-KR" altLang="en-US"/>
-              </a:p>
-            </p:txBody>
-          </p:sp>
-          <p:sp>
-            <p:nvSpPr>
-              <p:cNvPr id="21" name="순서도: 연결자 20"/>
-              <p:cNvSpPr/>
-              <p:nvPr/>
-            </p:nvSpPr>
-            <p:spPr>
-              <a:xfrm>
-                <a:off x="6293158" y="4694102"/>
-                <a:ext cx="144016" cy="144016"/>
-              </a:xfrm>
-              <a:prstGeom prst="flowChartConnector">
-                <a:avLst/>
-              </a:prstGeom>
-            </p:spPr>
-            <p:style>
-              <a:lnRef idx="2">
-                <a:schemeClr val="accent1">
-                  <a:shade val="50000"/>
-                </a:schemeClr>
-              </a:lnRef>
-              <a:fillRef idx="1">
-                <a:schemeClr val="accent1"/>
-              </a:fillRef>
-              <a:effectRef idx="0">
-                <a:schemeClr val="accent1"/>
-              </a:effectRef>
-              <a:fontRef idx="minor">
-                <a:schemeClr val="lt1"/>
-              </a:fontRef>
-            </p:style>
-            <p:txBody>
-              <a:bodyPr rtlCol="0" anchor="ctr"/>
-              <a:lstStyle/>
-              <a:p>
-                <a:pPr algn="ctr"/>
-                <a:endParaRPr lang="ko-KR" altLang="en-US"/>
-              </a:p>
-            </p:txBody>
-          </p:sp>
-          <p:sp>
-            <p:nvSpPr>
-              <p:cNvPr id="22" name="순서도: 연결자 21"/>
-              <p:cNvSpPr/>
-              <p:nvPr/>
-            </p:nvSpPr>
-            <p:spPr>
-              <a:xfrm>
-                <a:off x="5422029" y="4694102"/>
-                <a:ext cx="144016" cy="144016"/>
-              </a:xfrm>
-              <a:prstGeom prst="flowChartConnector">
-                <a:avLst/>
-              </a:prstGeom>
-            </p:spPr>
-            <p:style>
-              <a:lnRef idx="2">
-                <a:schemeClr val="accent1">
-                  <a:shade val="50000"/>
-                </a:schemeClr>
-              </a:lnRef>
-              <a:fillRef idx="1">
-                <a:schemeClr val="accent1"/>
-              </a:fillRef>
-              <a:effectRef idx="0">
-                <a:schemeClr val="accent1"/>
-              </a:effectRef>
-              <a:fontRef idx="minor">
-                <a:schemeClr val="lt1"/>
-              </a:fontRef>
-            </p:style>
-            <p:txBody>
-              <a:bodyPr rtlCol="0" anchor="ctr"/>
-              <a:lstStyle/>
-              <a:p>
-                <a:pPr algn="ctr"/>
-                <a:endParaRPr lang="ko-KR" altLang="en-US"/>
-              </a:p>
-            </p:txBody>
-          </p:sp>
-          <p:sp>
-            <p:nvSpPr>
-              <p:cNvPr id="25" name="TextBox 24"/>
-              <p:cNvSpPr txBox="1"/>
-              <p:nvPr/>
-            </p:nvSpPr>
-            <p:spPr>
-              <a:xfrm>
-                <a:off x="4340952" y="4838118"/>
-                <a:ext cx="3871338" cy="317411"/>
-              </a:xfrm>
-              <a:prstGeom prst="rect">
-                <a:avLst/>
-              </a:prstGeom>
-              <a:noFill/>
-            </p:spPr>
-            <p:txBody>
-              <a:bodyPr wrap="square" rtlCol="0">
-                <a:spAutoFit/>
-              </a:bodyPr>
-              <a:lstStyle/>
-              <a:p>
-                <a:r>
-                  <a:rPr lang="ko-KR" altLang="en-US" dirty="0" smtClean="0">
-                    <a:latin typeface="+mn-ea"/>
-                  </a:rPr>
-                  <a:t>경기</a:t>
-                </a:r>
-                <a:r>
-                  <a:rPr lang="en-US" altLang="ko-KR" dirty="0" smtClean="0">
-                    <a:latin typeface="+mn-ea"/>
-                  </a:rPr>
-                  <a:t>       </a:t>
-                </a:r>
-                <a:r>
-                  <a:rPr lang="ko-KR" altLang="en-US" dirty="0" smtClean="0">
-                    <a:latin typeface="+mn-ea"/>
-                  </a:rPr>
-                  <a:t>중부</a:t>
-                </a:r>
-                <a:r>
-                  <a:rPr lang="en-US" altLang="ko-KR" dirty="0">
-                    <a:latin typeface="+mn-ea"/>
-                  </a:rPr>
-                  <a:t> </a:t>
-                </a:r>
-                <a:r>
-                  <a:rPr lang="en-US" altLang="ko-KR" dirty="0" smtClean="0">
-                    <a:latin typeface="+mn-ea"/>
-                  </a:rPr>
-                  <a:t>      </a:t>
-                </a:r>
-                <a:r>
-                  <a:rPr lang="ko-KR" altLang="en-US" dirty="0" smtClean="0">
-                    <a:latin typeface="+mn-ea"/>
-                  </a:rPr>
-                  <a:t>영남</a:t>
-                </a:r>
-                <a:r>
-                  <a:rPr lang="en-US" altLang="ko-KR" dirty="0">
-                    <a:latin typeface="+mn-ea"/>
-                  </a:rPr>
-                  <a:t> </a:t>
-                </a:r>
-                <a:r>
-                  <a:rPr lang="en-US" altLang="ko-KR" dirty="0" smtClean="0">
-                    <a:latin typeface="+mn-ea"/>
-                  </a:rPr>
-                  <a:t>     </a:t>
-                </a:r>
-                <a:r>
-                  <a:rPr lang="ko-KR" altLang="en-US" dirty="0" smtClean="0">
-                    <a:latin typeface="+mn-ea"/>
-                  </a:rPr>
-                  <a:t>서부</a:t>
-                </a:r>
-                <a:endParaRPr lang="ko-KR" altLang="en-US" dirty="0"/>
-              </a:p>
-            </p:txBody>
-          </p:sp>
-        </p:grpSp>
+            <a:prstGeom prst="flowChartConnector">
+              <a:avLst/>
+            </a:prstGeom>
+          </p:spPr>
+          <p:style>
+            <a:lnRef idx="2">
+              <a:schemeClr val="accent1">
+                <a:shade val="50000"/>
+              </a:schemeClr>
+            </a:lnRef>
+            <a:fillRef idx="1">
+              <a:schemeClr val="accent1"/>
+            </a:fillRef>
+            <a:effectRef idx="0">
+              <a:schemeClr val="accent1"/>
+            </a:effectRef>
+            <a:fontRef idx="minor">
+              <a:schemeClr val="lt1"/>
+            </a:fontRef>
+          </p:style>
+          <p:txBody>
+            <a:bodyPr rtlCol="0" anchor="ctr"/>
+            <a:lstStyle/>
+            <a:p>
+              <a:pPr algn="ctr"/>
+              <a:endParaRPr lang="ko-KR" altLang="en-US"/>
+            </a:p>
+          </p:txBody>
+        </p:sp>
+        <p:sp>
+          <p:nvSpPr>
+            <p:cNvPr id="20" name="순서도: 연결자 19"/>
+            <p:cNvSpPr/>
+            <p:nvPr/>
+          </p:nvSpPr>
+          <p:spPr>
+            <a:xfrm>
+              <a:off x="7164288" y="4694102"/>
+              <a:ext cx="144016" cy="144016"/>
+            </a:xfrm>
+            <a:prstGeom prst="flowChartConnector">
+              <a:avLst/>
+            </a:prstGeom>
+          </p:spPr>
+          <p:style>
+            <a:lnRef idx="2">
+              <a:schemeClr val="accent1">
+                <a:shade val="50000"/>
+              </a:schemeClr>
+            </a:lnRef>
+            <a:fillRef idx="1">
+              <a:schemeClr val="accent1"/>
+            </a:fillRef>
+            <a:effectRef idx="0">
+              <a:schemeClr val="accent1"/>
+            </a:effectRef>
+            <a:fontRef idx="minor">
+              <a:schemeClr val="lt1"/>
+            </a:fontRef>
+          </p:style>
+          <p:txBody>
+            <a:bodyPr rtlCol="0" anchor="ctr"/>
+            <a:lstStyle/>
+            <a:p>
+              <a:pPr algn="ctr"/>
+              <a:endParaRPr lang="ko-KR" altLang="en-US"/>
+            </a:p>
+          </p:txBody>
+        </p:sp>
+        <p:sp>
+          <p:nvSpPr>
+            <p:cNvPr id="21" name="순서도: 연결자 20"/>
+            <p:cNvSpPr/>
+            <p:nvPr/>
+          </p:nvSpPr>
+          <p:spPr>
+            <a:xfrm>
+              <a:off x="6293158" y="4694102"/>
+              <a:ext cx="144016" cy="144016"/>
+            </a:xfrm>
+            <a:prstGeom prst="flowChartConnector">
+              <a:avLst/>
+            </a:prstGeom>
+          </p:spPr>
+          <p:style>
+            <a:lnRef idx="2">
+              <a:schemeClr val="accent1">
+                <a:shade val="50000"/>
+              </a:schemeClr>
+            </a:lnRef>
+            <a:fillRef idx="1">
+              <a:schemeClr val="accent1"/>
+            </a:fillRef>
+            <a:effectRef idx="0">
+              <a:schemeClr val="accent1"/>
+            </a:effectRef>
+            <a:fontRef idx="minor">
+              <a:schemeClr val="lt1"/>
+            </a:fontRef>
+          </p:style>
+          <p:txBody>
+            <a:bodyPr rtlCol="0" anchor="ctr"/>
+            <a:lstStyle/>
+            <a:p>
+              <a:pPr algn="ctr"/>
+              <a:endParaRPr lang="ko-KR" altLang="en-US"/>
+            </a:p>
+          </p:txBody>
+        </p:sp>
+        <p:sp>
+          <p:nvSpPr>
+            <p:cNvPr id="22" name="순서도: 연결자 21"/>
+            <p:cNvSpPr/>
+            <p:nvPr/>
+          </p:nvSpPr>
+          <p:spPr>
+            <a:xfrm>
+              <a:off x="5422029" y="4694102"/>
+              <a:ext cx="144016" cy="144016"/>
+            </a:xfrm>
+            <a:prstGeom prst="flowChartConnector">
+              <a:avLst/>
+            </a:prstGeom>
+          </p:spPr>
+          <p:style>
+            <a:lnRef idx="2">
+              <a:schemeClr val="accent1">
+                <a:shade val="50000"/>
+              </a:schemeClr>
+            </a:lnRef>
+            <a:fillRef idx="1">
+              <a:schemeClr val="accent1"/>
+            </a:fillRef>
+            <a:effectRef idx="0">
+              <a:schemeClr val="accent1"/>
+            </a:effectRef>
+            <a:fontRef idx="minor">
+              <a:schemeClr val="lt1"/>
+            </a:fontRef>
+          </p:style>
+          <p:txBody>
+            <a:bodyPr rtlCol="0" anchor="ctr"/>
+            <a:lstStyle/>
+            <a:p>
+              <a:pPr algn="ctr"/>
+              <a:endParaRPr lang="ko-KR" altLang="en-US"/>
+            </a:p>
+          </p:txBody>
+        </p:sp>
+        <p:sp>
+          <p:nvSpPr>
+            <p:cNvPr id="25" name="TextBox 24"/>
+            <p:cNvSpPr txBox="1"/>
+            <p:nvPr/>
+          </p:nvSpPr>
+          <p:spPr>
+            <a:xfrm>
+              <a:off x="4340952" y="4838118"/>
+              <a:ext cx="3871338" cy="317411"/>
+            </a:xfrm>
+            <a:prstGeom prst="rect">
+              <a:avLst/>
+            </a:prstGeom>
+            <a:noFill/>
+          </p:spPr>
+          <p:txBody>
+            <a:bodyPr wrap="square" rtlCol="0">
+              <a:spAutoFit/>
+            </a:bodyPr>
+            <a:lstStyle/>
+            <a:p>
+              <a:r>
+                <a:rPr lang="ko-KR" altLang="en-US" dirty="0" smtClean="0">
+                  <a:latin typeface="+mn-ea"/>
+                </a:rPr>
+                <a:t>경기</a:t>
+              </a:r>
+              <a:r>
+                <a:rPr lang="en-US" altLang="ko-KR" dirty="0" smtClean="0">
+                  <a:latin typeface="+mn-ea"/>
+                </a:rPr>
+                <a:t>       </a:t>
+              </a:r>
+              <a:r>
+                <a:rPr lang="ko-KR" altLang="en-US" dirty="0" smtClean="0">
+                  <a:latin typeface="+mn-ea"/>
+                </a:rPr>
+                <a:t>중부</a:t>
+              </a:r>
+              <a:r>
+                <a:rPr lang="en-US" altLang="ko-KR" dirty="0">
+                  <a:latin typeface="+mn-ea"/>
+                </a:rPr>
+                <a:t> </a:t>
+              </a:r>
+              <a:r>
+                <a:rPr lang="en-US" altLang="ko-KR" dirty="0" smtClean="0">
+                  <a:latin typeface="+mn-ea"/>
+                </a:rPr>
+                <a:t>      </a:t>
+              </a:r>
+              <a:r>
+                <a:rPr lang="ko-KR" altLang="en-US" dirty="0" smtClean="0">
+                  <a:latin typeface="+mn-ea"/>
+                </a:rPr>
+                <a:t>영남</a:t>
+              </a:r>
+              <a:r>
+                <a:rPr lang="en-US" altLang="ko-KR" dirty="0">
+                  <a:latin typeface="+mn-ea"/>
+                </a:rPr>
+                <a:t> </a:t>
+              </a:r>
+              <a:r>
+                <a:rPr lang="en-US" altLang="ko-KR" dirty="0" smtClean="0">
+                  <a:latin typeface="+mn-ea"/>
+                </a:rPr>
+                <a:t>     </a:t>
+              </a:r>
+              <a:r>
+                <a:rPr lang="ko-KR" altLang="en-US" dirty="0" smtClean="0">
+                  <a:latin typeface="+mn-ea"/>
+                </a:rPr>
+                <a:t>서부</a:t>
+              </a:r>
+              <a:endParaRPr lang="ko-KR" altLang="en-US" dirty="0"/>
+            </a:p>
+          </p:txBody>
+        </p:sp>
       </p:grpSp>
       <p:sp>
         <p:nvSpPr>

</xml_diff>